<commit_message>
Some notes to enhance the presentation
</commit_message>
<xml_diff>
--- a/docs/Rede Neural Recorrente – Long Short-Term Memory.pptx
+++ b/docs/Rede Neural Recorrente – Long Short-Term Memory.pptx
@@ -6,22 +6,25 @@
   </p:sldMasterIdLst>
   <p:sldIdLst>
     <p:sldId id="256" r:id="rId2"/>
-    <p:sldId id="257" r:id="rId3"/>
-    <p:sldId id="258" r:id="rId4"/>
-    <p:sldId id="259" r:id="rId5"/>
-    <p:sldId id="269" r:id="rId6"/>
-    <p:sldId id="260" r:id="rId7"/>
-    <p:sldId id="262" r:id="rId8"/>
-    <p:sldId id="261" r:id="rId9"/>
-    <p:sldId id="270" r:id="rId10"/>
-    <p:sldId id="263" r:id="rId11"/>
-    <p:sldId id="264" r:id="rId12"/>
-    <p:sldId id="265" r:id="rId13"/>
-    <p:sldId id="272" r:id="rId14"/>
-    <p:sldId id="266" r:id="rId15"/>
-    <p:sldId id="267" r:id="rId16"/>
-    <p:sldId id="273" r:id="rId17"/>
-    <p:sldId id="268" r:id="rId18"/>
+    <p:sldId id="274" r:id="rId3"/>
+    <p:sldId id="257" r:id="rId4"/>
+    <p:sldId id="258" r:id="rId5"/>
+    <p:sldId id="259" r:id="rId6"/>
+    <p:sldId id="269" r:id="rId7"/>
+    <p:sldId id="260" r:id="rId8"/>
+    <p:sldId id="262" r:id="rId9"/>
+    <p:sldId id="261" r:id="rId10"/>
+    <p:sldId id="270" r:id="rId11"/>
+    <p:sldId id="263" r:id="rId12"/>
+    <p:sldId id="264" r:id="rId13"/>
+    <p:sldId id="265" r:id="rId14"/>
+    <p:sldId id="272" r:id="rId15"/>
+    <p:sldId id="276" r:id="rId16"/>
+    <p:sldId id="266" r:id="rId17"/>
+    <p:sldId id="267" r:id="rId18"/>
+    <p:sldId id="273" r:id="rId19"/>
+    <p:sldId id="268" r:id="rId20"/>
+    <p:sldId id="275" r:id="rId21"/>
   </p:sldIdLst>
   <p:sldSz cx="12192000" cy="6858000"/>
   <p:notesSz cx="6858000" cy="9144000"/>
@@ -120,6 +123,11 @@
       </a:defRPr>
     </a:lvl9pPr>
   </p:defaultTextStyle>
+  <p:extLst>
+    <p:ext uri="{EFAFB233-063F-42B5-8137-9DF3F51BA10A}">
+      <p15:sldGuideLst xmlns:p15="http://schemas.microsoft.com/office/powerpoint/2012/main"/>
+    </p:ext>
+  </p:extLst>
 </p:presentation>
 </file>
 
@@ -3275,7 +3283,7 @@
           <a:p>
             <a:fld id="{02AC24A9-CCB6-4F8D-B8DB-C2F3692CFA5A}" type="datetimeFigureOut">
               <a:rPr lang="en-US" smtClean="0"/>
-              <a:t>4/20/2020</a:t>
+              <a:t>4/21/2020</a:t>
             </a:fld>
             <a:endParaRPr lang="en-US" dirty="0"/>
           </a:p>
@@ -3645,7 +3653,7 @@
           <a:p>
             <a:fld id="{02AC24A9-CCB6-4F8D-B8DB-C2F3692CFA5A}" type="datetimeFigureOut">
               <a:rPr lang="en-US" smtClean="0"/>
-              <a:t>4/20/2020</a:t>
+              <a:t>4/21/2020</a:t>
             </a:fld>
             <a:endParaRPr lang="en-US"/>
           </a:p>
@@ -3854,7 +3862,7 @@
           <a:p>
             <a:fld id="{02AC24A9-CCB6-4F8D-B8DB-C2F3692CFA5A}" type="datetimeFigureOut">
               <a:rPr lang="en-US" smtClean="0"/>
-              <a:t>4/20/2020</a:t>
+              <a:t>4/21/2020</a:t>
             </a:fld>
             <a:endParaRPr lang="en-US"/>
           </a:p>
@@ -4324,7 +4332,7 @@
           <a:p>
             <a:fld id="{02AC24A9-CCB6-4F8D-B8DB-C2F3692CFA5A}" type="datetimeFigureOut">
               <a:rPr lang="en-US" smtClean="0"/>
-              <a:t>4/20/2020</a:t>
+              <a:t>4/21/2020</a:t>
             </a:fld>
             <a:endParaRPr lang="en-US"/>
           </a:p>
@@ -4778,7 +4786,7 @@
           <a:p>
             <a:fld id="{02AC24A9-CCB6-4F8D-B8DB-C2F3692CFA5A}" type="datetimeFigureOut">
               <a:rPr lang="en-US" smtClean="0"/>
-              <a:t>4/20/2020</a:t>
+              <a:t>4/21/2020</a:t>
             </a:fld>
             <a:endParaRPr lang="en-US"/>
           </a:p>
@@ -5310,7 +5318,7 @@
           <a:p>
             <a:fld id="{02AC24A9-CCB6-4F8D-B8DB-C2F3692CFA5A}" type="datetimeFigureOut">
               <a:rPr lang="en-US" smtClean="0"/>
-              <a:t>4/20/2020</a:t>
+              <a:t>4/21/2020</a:t>
             </a:fld>
             <a:endParaRPr lang="en-US"/>
           </a:p>
@@ -6009,7 +6017,7 @@
           <a:p>
             <a:fld id="{02AC24A9-CCB6-4F8D-B8DB-C2F3692CFA5A}" type="datetimeFigureOut">
               <a:rPr lang="en-US" smtClean="0"/>
-              <a:t>4/20/2020</a:t>
+              <a:t>4/21/2020</a:t>
             </a:fld>
             <a:endParaRPr lang="en-US"/>
           </a:p>
@@ -6338,7 +6346,7 @@
           <a:p>
             <a:fld id="{02AC24A9-CCB6-4F8D-B8DB-C2F3692CFA5A}" type="datetimeFigureOut">
               <a:rPr lang="en-US" smtClean="0"/>
-              <a:t>4/20/2020</a:t>
+              <a:t>4/21/2020</a:t>
             </a:fld>
             <a:endParaRPr lang="en-US"/>
           </a:p>
@@ -6451,7 +6459,7 @@
           <a:p>
             <a:fld id="{02AC24A9-CCB6-4F8D-B8DB-C2F3692CFA5A}" type="datetimeFigureOut">
               <a:rPr lang="en-US" smtClean="0"/>
-              <a:t>4/20/2020</a:t>
+              <a:t>4/21/2020</a:t>
             </a:fld>
             <a:endParaRPr lang="en-US"/>
           </a:p>
@@ -6946,7 +6954,7 @@
           <a:p>
             <a:fld id="{02AC24A9-CCB6-4F8D-B8DB-C2F3692CFA5A}" type="datetimeFigureOut">
               <a:rPr lang="en-US" smtClean="0"/>
-              <a:t>4/20/2020</a:t>
+              <a:t>4/21/2020</a:t>
             </a:fld>
             <a:endParaRPr lang="en-US" dirty="0"/>
           </a:p>
@@ -7423,7 +7431,7 @@
           <a:p>
             <a:fld id="{02AC24A9-CCB6-4F8D-B8DB-C2F3692CFA5A}" type="datetimeFigureOut">
               <a:rPr lang="en-US" smtClean="0"/>
-              <a:t>4/20/2020</a:t>
+              <a:t>4/21/2020</a:t>
             </a:fld>
             <a:endParaRPr lang="en-US"/>
           </a:p>
@@ -7666,7 +7674,7 @@
           <a:p>
             <a:fld id="{02AC24A9-CCB6-4F8D-B8DB-C2F3692CFA5A}" type="datetimeFigureOut">
               <a:rPr lang="en-US" smtClean="0"/>
-              <a:t>4/20/2020</a:t>
+              <a:t>4/21/2020</a:t>
             </a:fld>
             <a:endParaRPr lang="en-US"/>
           </a:p>
@@ -8375,6 +8383,72 @@
           <p:cNvPr id="2" name="Título 1">
             <a:extLst>
               <a:ext uri="{FF2B5EF4-FFF2-40B4-BE49-F238E27FC236}">
+                <a16:creationId xmlns:a16="http://schemas.microsoft.com/office/drawing/2014/main" id="{137722C4-DACF-4430-A32B-7FAC84A2AEB4}"/>
+              </a:ext>
+            </a:extLst>
+          </p:cNvPr>
+          <p:cNvSpPr>
+            <a:spLocks noGrp="1"/>
+          </p:cNvSpPr>
+          <p:nvPr>
+            <p:ph type="title"/>
+          </p:nvPr>
+        </p:nvSpPr>
+        <p:spPr>
+          <a:xfrm>
+            <a:off x="1524003" y="1999615"/>
+            <a:ext cx="9144000" cy="2764028"/>
+          </a:xfrm>
+        </p:spPr>
+        <p:txBody>
+          <a:bodyPr vert="horz" lIns="91440" tIns="45720" rIns="91440" bIns="45720" rtlCol="0" anchor="ctr">
+            <a:normAutofit/>
+          </a:bodyPr>
+          <a:lstStyle/>
+          <a:p>
+            <a:pPr algn="ctr"/>
+            <a:r>
+              <a:rPr lang="en-US" sz="7200" dirty="0"/>
+              <a:t>Teste</a:t>
+            </a:r>
+          </a:p>
+        </p:txBody>
+      </p:sp>
+    </p:spTree>
+    <p:extLst>
+      <p:ext uri="{BB962C8B-B14F-4D97-AF65-F5344CB8AC3E}">
+        <p14:creationId xmlns:p14="http://schemas.microsoft.com/office/powerpoint/2010/main" val="3407444029"/>
+      </p:ext>
+    </p:extLst>
+  </p:cSld>
+  <p:clrMapOvr>
+    <a:masterClrMapping/>
+  </p:clrMapOvr>
+</p:sld>
+</file>
+
+<file path=ppt/slides/slide11.xml><?xml version="1.0" encoding="utf-8"?>
+<p:sld xmlns:a="http://schemas.openxmlformats.org/drawingml/2006/main" xmlns:r="http://schemas.openxmlformats.org/officeDocument/2006/relationships" xmlns:p="http://schemas.openxmlformats.org/presentationml/2006/main">
+  <p:cSld>
+    <p:spTree>
+      <p:nvGrpSpPr>
+        <p:cNvPr id="1" name=""/>
+        <p:cNvGrpSpPr/>
+        <p:nvPr/>
+      </p:nvGrpSpPr>
+      <p:grpSpPr>
+        <a:xfrm>
+          <a:off x="0" y="0"/>
+          <a:ext cx="0" cy="0"/>
+          <a:chOff x="0" y="0"/>
+          <a:chExt cx="0" cy="0"/>
+        </a:xfrm>
+      </p:grpSpPr>
+      <p:sp>
+        <p:nvSpPr>
+          <p:cNvPr id="2" name="Título 1">
+            <a:extLst>
+              <a:ext uri="{FF2B5EF4-FFF2-40B4-BE49-F238E27FC236}">
                 <a16:creationId xmlns:a16="http://schemas.microsoft.com/office/drawing/2014/main" id="{86BCA422-EF78-449C-A1D0-466B4485522B}"/>
               </a:ext>
             </a:extLst>
@@ -8506,7 +8580,7 @@
 </p:sld>
 </file>
 
-<file path=ppt/slides/slide11.xml><?xml version="1.0" encoding="utf-8"?>
+<file path=ppt/slides/slide12.xml><?xml version="1.0" encoding="utf-8"?>
 <p:sld xmlns:a="http://schemas.openxmlformats.org/drawingml/2006/main" xmlns:r="http://schemas.openxmlformats.org/officeDocument/2006/relationships" xmlns:p="http://schemas.openxmlformats.org/presentationml/2006/main">
   <p:cSld>
     <p:bg>
@@ -9170,13 +9244,13 @@
         </p:nvSpPr>
         <p:spPr>
           <a:xfrm>
-            <a:off x="371094" y="2718054"/>
-            <a:ext cx="3438906" cy="3207258"/>
+            <a:off x="371094" y="2718053"/>
+            <a:ext cx="3438906" cy="3808581"/>
           </a:xfrm>
         </p:spPr>
         <p:txBody>
           <a:bodyPr anchor="t">
-            <a:normAutofit/>
+            <a:normAutofit fontScale="70000" lnSpcReduction="20000"/>
           </a:bodyPr>
           <a:lstStyle/>
           <a:p>
@@ -9186,8 +9260,24 @@
               </a:lnSpc>
             </a:pPr>
             <a:r>
-              <a:rPr lang="pt-BR" sz="1400"/>
-              <a:t>A partir de um array de arrays, ou seja, assim como nosso treino em X, nosso teste vai olhar para 20 pontos do passado mais recente, e dar uma resposta para gente baseado nesses 20 pontos (20 pontos dados do exemplo que pegamos, isso terá que ser modificado).</a:t>
+              <a:rPr lang="pt-BR" sz="1400" dirty="0"/>
+              <a:t>A partir de um </a:t>
+            </a:r>
+            <a:r>
+              <a:rPr lang="pt-BR" sz="1400" dirty="0" err="1"/>
+              <a:t>array</a:t>
+            </a:r>
+            <a:r>
+              <a:rPr lang="pt-BR" sz="1400" dirty="0"/>
+              <a:t> de </a:t>
+            </a:r>
+            <a:r>
+              <a:rPr lang="pt-BR" sz="1400" dirty="0" err="1"/>
+              <a:t>arrays</a:t>
+            </a:r>
+            <a:r>
+              <a:rPr lang="pt-BR" sz="1400" dirty="0"/>
+              <a:t>, ou seja, assim como nosso treino em X, nosso teste vai olhar para 20 pontos do passado mais recente, e dar uma resposta para gente baseado nesses 20 pontos (20 pontos dados do exemplo que pegamos, isso terá que ser modificado).</a:t>
             </a:r>
           </a:p>
           <a:p>
@@ -9197,8 +9287,95 @@
               </a:lnSpc>
             </a:pPr>
             <a:r>
-              <a:rPr lang="pt-BR" sz="1400"/>
-              <a:t>Após isso ele faz um comparação com o resultado real e isso dá o loss do nosso val.</a:t>
+              <a:rPr lang="pt-BR" sz="1400" dirty="0"/>
+              <a:t>Após isso ele faz um comparação com o resultado real e isso dá o </a:t>
+            </a:r>
+            <a:r>
+              <a:rPr lang="pt-BR" sz="1400" dirty="0" err="1"/>
+              <a:t>loss</a:t>
+            </a:r>
+            <a:r>
+              <a:rPr lang="pt-BR" sz="1400" dirty="0"/>
+              <a:t> do nosso val.</a:t>
+            </a:r>
+          </a:p>
+          <a:p>
+            <a:pPr>
+              <a:lnSpc>
+                <a:spcPct val="100000"/>
+              </a:lnSpc>
+            </a:pPr>
+            <a:r>
+              <a:rPr lang="pt-BR" sz="1400" b="1" dirty="0"/>
+              <a:t>Conforme o tempo passa ela vai perdendo precisão, ou seja e o poder de previsão vai diminuindo.</a:t>
+            </a:r>
+          </a:p>
+          <a:p>
+            <a:pPr>
+              <a:lnSpc>
+                <a:spcPct val="100000"/>
+              </a:lnSpc>
+            </a:pPr>
+            <a:r>
+              <a:rPr lang="pt-BR" sz="1400" b="1" dirty="0"/>
+              <a:t>Usar alguma ferramenta pra medir a diferença dessa curva.</a:t>
+            </a:r>
+          </a:p>
+          <a:p>
+            <a:pPr>
+              <a:lnSpc>
+                <a:spcPct val="100000"/>
+              </a:lnSpc>
+            </a:pPr>
+            <a:r>
+              <a:rPr lang="pt-BR" sz="1400" b="1" dirty="0"/>
+              <a:t>Usar o teste de aderência </a:t>
+            </a:r>
+            <a:r>
+              <a:rPr lang="pt-BR" sz="1400" b="1" dirty="0" err="1"/>
+              <a:t>chisquare</a:t>
+            </a:r>
+            <a:r>
+              <a:rPr lang="pt-BR" sz="1400" b="1" dirty="0"/>
+              <a:t>, (Medir a aderência do observado com o teórico) ou seja, verificar como ela vai perdendo a aderência.</a:t>
+            </a:r>
+          </a:p>
+          <a:p>
+            <a:pPr>
+              <a:lnSpc>
+                <a:spcPct val="100000"/>
+              </a:lnSpc>
+            </a:pPr>
+            <a:r>
+              <a:rPr lang="pt-BR" sz="1400" b="1" dirty="0"/>
+              <a:t>Mudando os passos do treinamento verificar se o </a:t>
+            </a:r>
+            <a:r>
+              <a:rPr lang="pt-BR" sz="1400" b="1" dirty="0" err="1"/>
+              <a:t>loss</a:t>
+            </a:r>
+            <a:r>
+              <a:rPr lang="pt-BR" sz="1400" b="1" dirty="0"/>
+              <a:t> satura ou se ele pode ficar menor (otimização) e ir verificando o resultado do </a:t>
+            </a:r>
+            <a:r>
+              <a:rPr lang="pt-BR" sz="1400" b="1" dirty="0" err="1"/>
+              <a:t>chisquare</a:t>
+            </a:r>
+            <a:r>
+              <a:rPr lang="pt-BR" sz="1400" b="1" dirty="0"/>
+              <a:t> de aderência.</a:t>
+            </a:r>
+          </a:p>
+          <a:p>
+            <a:pPr>
+              <a:lnSpc>
+                <a:spcPct val="100000"/>
+              </a:lnSpc>
+            </a:pPr>
+            <a:r>
+              <a:rPr lang="pt-BR" sz="1400" b="1" dirty="0"/>
+              <a:t>Entender como funciona o batch e a relação que ele tem com o número 20 de passos que foi definido. </a:t>
             </a:r>
           </a:p>
         </p:txBody>
@@ -9246,7 +9423,7 @@
 </p:sld>
 </file>
 
-<file path=ppt/slides/slide12.xml><?xml version="1.0" encoding="utf-8"?>
+<file path=ppt/slides/slide13.xml><?xml version="1.0" encoding="utf-8"?>
 <p:sld xmlns:a="http://schemas.openxmlformats.org/drawingml/2006/main" xmlns:r="http://schemas.openxmlformats.org/officeDocument/2006/relationships" xmlns:p="http://schemas.openxmlformats.org/presentationml/2006/main">
   <p:cSld>
     <p:spTree>
@@ -9317,7 +9494,7 @@
         </p:spPr>
         <p:txBody>
           <a:bodyPr>
-            <a:normAutofit fontScale="92500" lnSpcReduction="20000"/>
+            <a:normAutofit fontScale="85000" lnSpcReduction="20000"/>
           </a:bodyPr>
           <a:lstStyle/>
           <a:p>
@@ -9346,6 +9523,20 @@
             <a:r>
               <a:rPr lang="pt-BR" dirty="0"/>
               <a:t>Pelo fato de ser um modelo simples,. Obtivemos uma correlação de 1.0</a:t>
+            </a:r>
+          </a:p>
+          <a:p>
+            <a:r>
+              <a:rPr lang="pt-BR" dirty="0"/>
+              <a:t>Entender o </a:t>
+            </a:r>
+            <a:r>
+              <a:rPr lang="pt-BR" dirty="0" err="1"/>
+              <a:t>univariate_future_target</a:t>
+            </a:r>
+            <a:r>
+              <a:rPr lang="pt-BR" dirty="0"/>
+              <a:t> = 1.</a:t>
             </a:r>
           </a:p>
         </p:txBody>
@@ -9423,7 +9614,7 @@
 </p:sld>
 </file>
 
-<file path=ppt/slides/slide13.xml><?xml version="1.0" encoding="utf-8"?>
+<file path=ppt/slides/slide14.xml><?xml version="1.0" encoding="utf-8"?>
 <p:sld xmlns:a="http://schemas.openxmlformats.org/drawingml/2006/main" xmlns:r="http://schemas.openxmlformats.org/officeDocument/2006/relationships" xmlns:p="http://schemas.openxmlformats.org/presentationml/2006/main">
   <p:cSld>
     <p:spTree>
@@ -9489,7 +9680,96 @@
 </p:sld>
 </file>
 
-<file path=ppt/slides/slide14.xml><?xml version="1.0" encoding="utf-8"?>
+<file path=ppt/slides/slide15.xml><?xml version="1.0" encoding="utf-8"?>
+<p:sld xmlns:a="http://schemas.openxmlformats.org/drawingml/2006/main" xmlns:r="http://schemas.openxmlformats.org/officeDocument/2006/relationships" xmlns:p="http://schemas.openxmlformats.org/presentationml/2006/main">
+  <p:cSld>
+    <p:spTree>
+      <p:nvGrpSpPr>
+        <p:cNvPr id="1" name=""/>
+        <p:cNvGrpSpPr/>
+        <p:nvPr/>
+      </p:nvGrpSpPr>
+      <p:grpSpPr>
+        <a:xfrm>
+          <a:off x="0" y="0"/>
+          <a:ext cx="0" cy="0"/>
+          <a:chOff x="0" y="0"/>
+          <a:chExt cx="0" cy="0"/>
+        </a:xfrm>
+      </p:grpSpPr>
+      <p:sp>
+        <p:nvSpPr>
+          <p:cNvPr id="2" name="Título 1">
+            <a:extLst>
+              <a:ext uri="{FF2B5EF4-FFF2-40B4-BE49-F238E27FC236}">
+                <a16:creationId xmlns:a16="http://schemas.microsoft.com/office/drawing/2014/main" id="{0F3E9ED3-0532-4BF3-8627-E581EBD8FBD8}"/>
+              </a:ext>
+            </a:extLst>
+          </p:cNvPr>
+          <p:cNvSpPr>
+            <a:spLocks noGrp="1"/>
+          </p:cNvSpPr>
+          <p:nvPr>
+            <p:ph type="title"/>
+          </p:nvPr>
+        </p:nvSpPr>
+        <p:spPr/>
+        <p:txBody>
+          <a:bodyPr/>
+          <a:lstStyle/>
+          <a:p>
+            <a:endParaRPr lang="pt-BR"/>
+          </a:p>
+        </p:txBody>
+      </p:sp>
+      <p:sp>
+        <p:nvSpPr>
+          <p:cNvPr id="3" name="Espaço Reservado para Conteúdo 2">
+            <a:extLst>
+              <a:ext uri="{FF2B5EF4-FFF2-40B4-BE49-F238E27FC236}">
+                <a16:creationId xmlns:a16="http://schemas.microsoft.com/office/drawing/2014/main" id="{F5E9EBC4-F74C-4E69-B607-514AA9D22B53}"/>
+              </a:ext>
+            </a:extLst>
+          </p:cNvPr>
+          <p:cNvSpPr>
+            <a:spLocks noGrp="1"/>
+          </p:cNvSpPr>
+          <p:nvPr>
+            <p:ph idx="1"/>
+          </p:nvPr>
+        </p:nvSpPr>
+        <p:spPr/>
+        <p:txBody>
+          <a:bodyPr/>
+          <a:lstStyle/>
+          <a:p>
+            <a:r>
+              <a:rPr lang="pt-BR" dirty="0"/>
+              <a:t>Explicar o que é uma rede neural.</a:t>
+            </a:r>
+          </a:p>
+          <a:p>
+            <a:r>
+              <a:rPr lang="pt-BR" dirty="0"/>
+              <a:t>Explicar os tipos de treinamento.</a:t>
+            </a:r>
+          </a:p>
+        </p:txBody>
+      </p:sp>
+    </p:spTree>
+    <p:extLst>
+      <p:ext uri="{BB962C8B-B14F-4D97-AF65-F5344CB8AC3E}">
+        <p14:creationId xmlns:p14="http://schemas.microsoft.com/office/powerpoint/2010/main" val="246382912"/>
+      </p:ext>
+    </p:extLst>
+  </p:cSld>
+  <p:clrMapOvr>
+    <a:masterClrMapping/>
+  </p:clrMapOvr>
+</p:sld>
+</file>
+
+<file path=ppt/slides/slide16.xml><?xml version="1.0" encoding="utf-8"?>
 <p:sld xmlns:a="http://schemas.openxmlformats.org/drawingml/2006/main" xmlns:r="http://schemas.openxmlformats.org/officeDocument/2006/relationships" xmlns:p="http://schemas.openxmlformats.org/presentationml/2006/main">
   <p:cSld>
     <p:bg>
@@ -10154,12 +10434,12 @@
         <p:spPr>
           <a:xfrm>
             <a:off x="371094" y="2718054"/>
-            <a:ext cx="3438906" cy="3207258"/>
+            <a:ext cx="3438906" cy="3731570"/>
           </a:xfrm>
         </p:spPr>
         <p:txBody>
           <a:bodyPr anchor="t">
-            <a:normAutofit/>
+            <a:normAutofit fontScale="92500" lnSpcReduction="10000"/>
           </a:bodyPr>
           <a:lstStyle/>
           <a:p>
@@ -10169,7 +10449,7 @@
               </a:lnSpc>
             </a:pPr>
             <a:r>
-              <a:rPr lang="pt-BR" sz="1700"/>
+              <a:rPr lang="pt-BR" sz="1700" dirty="0"/>
               <a:t>A rede neural recorrente trabalha de forma que ela realiza a mesma função para todos os inputs, enquanto o output do input atual, depende da computação do input mais recente.</a:t>
             </a:r>
           </a:p>
@@ -10180,8 +10460,8 @@
               </a:lnSpc>
             </a:pPr>
             <a:r>
-              <a:rPr lang="pt-BR" sz="1700"/>
-              <a:t>Depois de ela produzir um output, ele é copiado e mandado de volta para rede recorrente.</a:t>
+              <a:rPr lang="pt-BR" sz="1700" dirty="0"/>
+              <a:t>Explicar melhor de maneira que de a entender que é uma rede retroalimentada(recorrente).</a:t>
             </a:r>
           </a:p>
           <a:p>
@@ -10190,7 +10470,26 @@
                 <a:spcPct val="100000"/>
               </a:lnSpc>
             </a:pPr>
-            <a:endParaRPr lang="pt-BR" sz="1700"/>
+            <a:r>
+              <a:rPr lang="pt-BR" sz="1700" dirty="0"/>
+              <a:t>Depois de ela produzir um output, ele é copiado e mandado de volta para rede recorrente.</a:t>
+            </a:r>
+          </a:p>
+          <a:p>
+            <a:pPr>
+              <a:lnSpc>
+                <a:spcPct val="100000"/>
+              </a:lnSpc>
+            </a:pPr>
+            <a:endParaRPr lang="pt-BR" sz="1700" dirty="0"/>
+          </a:p>
+          <a:p>
+            <a:pPr>
+              <a:lnSpc>
+                <a:spcPct val="100000"/>
+              </a:lnSpc>
+            </a:pPr>
+            <a:endParaRPr lang="pt-BR" sz="1700" dirty="0"/>
           </a:p>
         </p:txBody>
       </p:sp>
@@ -10224,6 +10523,49 @@
           </a:prstGeom>
         </p:spPr>
       </p:pic>
+      <p:sp>
+        <p:nvSpPr>
+          <p:cNvPr id="5" name="CaixaDeTexto 4">
+            <a:extLst>
+              <a:ext uri="{FF2B5EF4-FFF2-40B4-BE49-F238E27FC236}">
+                <a16:creationId xmlns:a16="http://schemas.microsoft.com/office/drawing/2014/main" id="{ADEDB3BF-D7FE-41A9-997A-0B5B9DE24C77}"/>
+              </a:ext>
+            </a:extLst>
+          </p:cNvPr>
+          <p:cNvSpPr txBox="1"/>
+          <p:nvPr/>
+        </p:nvSpPr>
+        <p:spPr>
+          <a:xfrm>
+            <a:off x="5847126" y="4989089"/>
+            <a:ext cx="4823670" cy="646331"/>
+          </a:xfrm>
+          <a:prstGeom prst="rect">
+            <a:avLst/>
+          </a:prstGeom>
+          <a:noFill/>
+        </p:spPr>
+        <p:txBody>
+          <a:bodyPr wrap="square" rtlCol="0">
+            <a:spAutoFit/>
+          </a:bodyPr>
+          <a:lstStyle/>
+          <a:p>
+            <a:r>
+              <a:rPr lang="pt-BR" dirty="0"/>
+              <a:t>Explicar o que é o </a:t>
+            </a:r>
+            <a:r>
+              <a:rPr lang="pt-BR" dirty="0" err="1"/>
+              <a:t>hi</a:t>
+            </a:r>
+            <a:r>
+              <a:rPr lang="pt-BR" dirty="0"/>
+              <a:t>, o xi e A. e referenciar a imagem.</a:t>
+            </a:r>
+          </a:p>
+        </p:txBody>
+      </p:sp>
     </p:spTree>
     <p:extLst>
       <p:ext uri="{BB962C8B-B14F-4D97-AF65-F5344CB8AC3E}">
@@ -10237,7 +10579,7 @@
 </p:sld>
 </file>
 
-<file path=ppt/slides/slide15.xml><?xml version="1.0" encoding="utf-8"?>
+<file path=ppt/slides/slide17.xml><?xml version="1.0" encoding="utf-8"?>
 <p:sld xmlns:a="http://schemas.openxmlformats.org/drawingml/2006/main" xmlns:r="http://schemas.openxmlformats.org/officeDocument/2006/relationships" xmlns:p="http://schemas.openxmlformats.org/presentationml/2006/main">
   <p:cSld>
     <p:bg>
@@ -10967,7 +11309,7 @@
 </p:sld>
 </file>
 
-<file path=ppt/slides/slide16.xml><?xml version="1.0" encoding="utf-8"?>
+<file path=ppt/slides/slide18.xml><?xml version="1.0" encoding="utf-8"?>
 <p:sld xmlns:a="http://schemas.openxmlformats.org/drawingml/2006/main" xmlns:r="http://schemas.openxmlformats.org/officeDocument/2006/relationships" xmlns:p="http://schemas.openxmlformats.org/presentationml/2006/main">
   <p:cSld>
     <p:bg>
@@ -11561,7 +11903,7 @@
 </p:sld>
 </file>
 
-<file path=ppt/slides/slide17.xml><?xml version="1.0" encoding="utf-8"?>
+<file path=ppt/slides/slide19.xml><?xml version="1.0" encoding="utf-8"?>
 <p:sld xmlns:a="http://schemas.openxmlformats.org/drawingml/2006/main" xmlns:r="http://schemas.openxmlformats.org/officeDocument/2006/relationships" xmlns:p="http://schemas.openxmlformats.org/presentationml/2006/main">
   <p:cSld>
     <p:spTree>
@@ -11601,7 +11943,7 @@
           <a:p>
             <a:r>
               <a:rPr lang="pt-BR" dirty="0"/>
-              <a:t>Bibliografia</a:t>
+              <a:t>Referências</a:t>
             </a:r>
           </a:p>
         </p:txBody>
@@ -11714,6 +12056,461 @@
 </file>
 
 <file path=ppt/slides/slide2.xml><?xml version="1.0" encoding="utf-8"?>
+<p:sld xmlns:a="http://schemas.openxmlformats.org/drawingml/2006/main" xmlns:r="http://schemas.openxmlformats.org/officeDocument/2006/relationships" xmlns:p="http://schemas.openxmlformats.org/presentationml/2006/main">
+  <p:cSld>
+    <p:spTree>
+      <p:nvGrpSpPr>
+        <p:cNvPr id="1" name=""/>
+        <p:cNvGrpSpPr/>
+        <p:nvPr/>
+      </p:nvGrpSpPr>
+      <p:grpSpPr>
+        <a:xfrm>
+          <a:off x="0" y="0"/>
+          <a:ext cx="0" cy="0"/>
+          <a:chOff x="0" y="0"/>
+          <a:chExt cx="0" cy="0"/>
+        </a:xfrm>
+      </p:grpSpPr>
+      <p:sp>
+        <p:nvSpPr>
+          <p:cNvPr id="2" name="Título 1">
+            <a:extLst>
+              <a:ext uri="{FF2B5EF4-FFF2-40B4-BE49-F238E27FC236}">
+                <a16:creationId xmlns:a16="http://schemas.microsoft.com/office/drawing/2014/main" id="{9B5B2614-7304-4719-9939-C253123D8997}"/>
+              </a:ext>
+            </a:extLst>
+          </p:cNvPr>
+          <p:cNvSpPr>
+            <a:spLocks noGrp="1"/>
+          </p:cNvSpPr>
+          <p:nvPr>
+            <p:ph type="title"/>
+          </p:nvPr>
+        </p:nvSpPr>
+        <p:spPr/>
+        <p:txBody>
+          <a:bodyPr/>
+          <a:lstStyle/>
+          <a:p>
+            <a:r>
+              <a:rPr lang="pt-BR" dirty="0"/>
+              <a:t>Grupo</a:t>
+            </a:r>
+          </a:p>
+        </p:txBody>
+      </p:sp>
+      <p:sp>
+        <p:nvSpPr>
+          <p:cNvPr id="3" name="Espaço Reservado para Conteúdo 2">
+            <a:extLst>
+              <a:ext uri="{FF2B5EF4-FFF2-40B4-BE49-F238E27FC236}">
+                <a16:creationId xmlns:a16="http://schemas.microsoft.com/office/drawing/2014/main" id="{BDC4AA00-801A-4A16-ACCA-948891165E42}"/>
+              </a:ext>
+            </a:extLst>
+          </p:cNvPr>
+          <p:cNvSpPr>
+            <a:spLocks noGrp="1"/>
+          </p:cNvSpPr>
+          <p:nvPr>
+            <p:ph idx="1"/>
+          </p:nvPr>
+        </p:nvSpPr>
+        <p:spPr>
+          <a:xfrm>
+            <a:off x="1115568" y="2478024"/>
+            <a:ext cx="4110773" cy="3694176"/>
+          </a:xfrm>
+        </p:spPr>
+        <p:txBody>
+          <a:bodyPr>
+            <a:normAutofit/>
+          </a:bodyPr>
+          <a:lstStyle/>
+          <a:p>
+            <a:r>
+              <a:rPr lang="pt-BR" sz="2000" dirty="0"/>
+              <a:t>Diego de Moraes Aguiar</a:t>
+            </a:r>
+          </a:p>
+          <a:p>
+            <a:r>
+              <a:rPr lang="pt-BR" sz="2000" dirty="0"/>
+              <a:t>Gustavo </a:t>
+            </a:r>
+            <a:r>
+              <a:rPr lang="pt-BR" sz="2000" dirty="0" err="1"/>
+              <a:t>Donnangelo</a:t>
+            </a:r>
+            <a:r>
+              <a:rPr lang="pt-BR" sz="2000" dirty="0"/>
+              <a:t> </a:t>
+            </a:r>
+            <a:r>
+              <a:rPr lang="pt-BR" sz="2000" dirty="0" err="1"/>
+              <a:t>Cassettari</a:t>
+            </a:r>
+            <a:endParaRPr lang="pt-BR" sz="2000" dirty="0"/>
+          </a:p>
+          <a:p>
+            <a:r>
+              <a:rPr lang="pt-BR" sz="2000" dirty="0"/>
+              <a:t>Leandro Sartini de Campos</a:t>
+            </a:r>
+          </a:p>
+        </p:txBody>
+      </p:sp>
+      <p:sp>
+        <p:nvSpPr>
+          <p:cNvPr id="4" name="Espaço Reservado para Conteúdo 2">
+            <a:extLst>
+              <a:ext uri="{FF2B5EF4-FFF2-40B4-BE49-F238E27FC236}">
+                <a16:creationId xmlns:a16="http://schemas.microsoft.com/office/drawing/2014/main" id="{37079D0A-6540-428C-915C-7C6A1019D906}"/>
+              </a:ext>
+            </a:extLst>
+          </p:cNvPr>
+          <p:cNvSpPr txBox="1">
+            <a:spLocks/>
+          </p:cNvSpPr>
+          <p:nvPr/>
+        </p:nvSpPr>
+        <p:spPr>
+          <a:xfrm>
+            <a:off x="6096000" y="4675940"/>
+            <a:ext cx="6091806" cy="3694176"/>
+          </a:xfrm>
+          <a:prstGeom prst="rect">
+            <a:avLst/>
+          </a:prstGeom>
+        </p:spPr>
+        <p:txBody>
+          <a:bodyPr vert="horz" lIns="91440" tIns="45720" rIns="91440" bIns="45720" rtlCol="0">
+            <a:normAutofit/>
+          </a:bodyPr>
+          <a:lstStyle>
+            <a:lvl1pPr marL="228600" indent="-228600" algn="l" defTabSz="914400" rtl="0" eaLnBrk="1" latinLnBrk="0" hangingPunct="1">
+              <a:lnSpc>
+                <a:spcPct val="110000"/>
+              </a:lnSpc>
+              <a:spcBef>
+                <a:spcPts val="1000"/>
+              </a:spcBef>
+              <a:buFont typeface="Arial" panose="020B0604020202020204" pitchFamily="34" charset="0"/>
+              <a:buChar char="•"/>
+              <a:defRPr sz="2800" kern="1200">
+                <a:solidFill>
+                  <a:schemeClr val="tx1"/>
+                </a:solidFill>
+                <a:latin typeface="+mn-lt"/>
+                <a:ea typeface="+mn-ea"/>
+                <a:cs typeface="+mn-cs"/>
+              </a:defRPr>
+            </a:lvl1pPr>
+            <a:lvl2pPr marL="685800" indent="-228600" algn="l" defTabSz="914400" rtl="0" eaLnBrk="1" latinLnBrk="0" hangingPunct="1">
+              <a:lnSpc>
+                <a:spcPct val="110000"/>
+              </a:lnSpc>
+              <a:spcBef>
+                <a:spcPts val="500"/>
+              </a:spcBef>
+              <a:buFont typeface="Arial" panose="020B0604020202020204" pitchFamily="34" charset="0"/>
+              <a:buChar char="•"/>
+              <a:defRPr sz="2400" kern="1200">
+                <a:solidFill>
+                  <a:schemeClr val="tx1"/>
+                </a:solidFill>
+                <a:latin typeface="+mn-lt"/>
+                <a:ea typeface="+mn-ea"/>
+                <a:cs typeface="+mn-cs"/>
+              </a:defRPr>
+            </a:lvl2pPr>
+            <a:lvl3pPr marL="1143000" indent="-228600" algn="l" defTabSz="914400" rtl="0" eaLnBrk="1" latinLnBrk="0" hangingPunct="1">
+              <a:lnSpc>
+                <a:spcPct val="110000"/>
+              </a:lnSpc>
+              <a:spcBef>
+                <a:spcPts val="500"/>
+              </a:spcBef>
+              <a:buFont typeface="Arial" panose="020B0604020202020204" pitchFamily="34" charset="0"/>
+              <a:buChar char="•"/>
+              <a:defRPr sz="2000" kern="1200">
+                <a:solidFill>
+                  <a:schemeClr val="tx1"/>
+                </a:solidFill>
+                <a:latin typeface="+mn-lt"/>
+                <a:ea typeface="+mn-ea"/>
+                <a:cs typeface="+mn-cs"/>
+              </a:defRPr>
+            </a:lvl3pPr>
+            <a:lvl4pPr marL="1600200" indent="-228600" algn="l" defTabSz="914400" rtl="0" eaLnBrk="1" latinLnBrk="0" hangingPunct="1">
+              <a:lnSpc>
+                <a:spcPct val="110000"/>
+              </a:lnSpc>
+              <a:spcBef>
+                <a:spcPts val="500"/>
+              </a:spcBef>
+              <a:buFont typeface="Arial" panose="020B0604020202020204" pitchFamily="34" charset="0"/>
+              <a:buChar char="•"/>
+              <a:defRPr sz="1800" kern="1200">
+                <a:solidFill>
+                  <a:schemeClr val="tx1"/>
+                </a:solidFill>
+                <a:latin typeface="+mn-lt"/>
+                <a:ea typeface="+mn-ea"/>
+                <a:cs typeface="+mn-cs"/>
+              </a:defRPr>
+            </a:lvl4pPr>
+            <a:lvl5pPr marL="2057400" indent="-228600" algn="l" defTabSz="914400" rtl="0" eaLnBrk="1" latinLnBrk="0" hangingPunct="1">
+              <a:lnSpc>
+                <a:spcPct val="110000"/>
+              </a:lnSpc>
+              <a:spcBef>
+                <a:spcPts val="500"/>
+              </a:spcBef>
+              <a:buFont typeface="Arial" panose="020B0604020202020204" pitchFamily="34" charset="0"/>
+              <a:buChar char="•"/>
+              <a:defRPr sz="1800" kern="1200">
+                <a:solidFill>
+                  <a:schemeClr val="tx1"/>
+                </a:solidFill>
+                <a:latin typeface="+mn-lt"/>
+                <a:ea typeface="+mn-ea"/>
+                <a:cs typeface="+mn-cs"/>
+              </a:defRPr>
+            </a:lvl5pPr>
+            <a:lvl6pPr marL="2514600" indent="-228600" algn="l" defTabSz="914400" rtl="0" eaLnBrk="1" latinLnBrk="0" hangingPunct="1">
+              <a:lnSpc>
+                <a:spcPct val="90000"/>
+              </a:lnSpc>
+              <a:spcBef>
+                <a:spcPts val="500"/>
+              </a:spcBef>
+              <a:buFont typeface="Arial" panose="020B0604020202020204" pitchFamily="34" charset="0"/>
+              <a:buChar char="•"/>
+              <a:defRPr sz="1800" kern="1200">
+                <a:solidFill>
+                  <a:schemeClr val="tx1"/>
+                </a:solidFill>
+                <a:latin typeface="+mn-lt"/>
+                <a:ea typeface="+mn-ea"/>
+                <a:cs typeface="+mn-cs"/>
+              </a:defRPr>
+            </a:lvl6pPr>
+            <a:lvl7pPr marL="2971800" indent="-228600" algn="l" defTabSz="914400" rtl="0" eaLnBrk="1" latinLnBrk="0" hangingPunct="1">
+              <a:lnSpc>
+                <a:spcPct val="90000"/>
+              </a:lnSpc>
+              <a:spcBef>
+                <a:spcPts val="500"/>
+              </a:spcBef>
+              <a:buFont typeface="Arial" panose="020B0604020202020204" pitchFamily="34" charset="0"/>
+              <a:buChar char="•"/>
+              <a:defRPr sz="1800" kern="1200">
+                <a:solidFill>
+                  <a:schemeClr val="tx1"/>
+                </a:solidFill>
+                <a:latin typeface="+mn-lt"/>
+                <a:ea typeface="+mn-ea"/>
+                <a:cs typeface="+mn-cs"/>
+              </a:defRPr>
+            </a:lvl7pPr>
+            <a:lvl8pPr marL="3429000" indent="-228600" algn="l" defTabSz="914400" rtl="0" eaLnBrk="1" latinLnBrk="0" hangingPunct="1">
+              <a:lnSpc>
+                <a:spcPct val="90000"/>
+              </a:lnSpc>
+              <a:spcBef>
+                <a:spcPts val="500"/>
+              </a:spcBef>
+              <a:buFont typeface="Arial" panose="020B0604020202020204" pitchFamily="34" charset="0"/>
+              <a:buChar char="•"/>
+              <a:defRPr sz="1800" kern="1200">
+                <a:solidFill>
+                  <a:schemeClr val="tx1"/>
+                </a:solidFill>
+                <a:latin typeface="+mn-lt"/>
+                <a:ea typeface="+mn-ea"/>
+                <a:cs typeface="+mn-cs"/>
+              </a:defRPr>
+            </a:lvl8pPr>
+            <a:lvl9pPr marL="3886200" indent="-228600" algn="l" defTabSz="914400" rtl="0" eaLnBrk="1" latinLnBrk="0" hangingPunct="1">
+              <a:lnSpc>
+                <a:spcPct val="90000"/>
+              </a:lnSpc>
+              <a:spcBef>
+                <a:spcPts val="500"/>
+              </a:spcBef>
+              <a:buFont typeface="Arial" panose="020B0604020202020204" pitchFamily="34" charset="0"/>
+              <a:buChar char="•"/>
+              <a:defRPr sz="1800" kern="1200">
+                <a:solidFill>
+                  <a:schemeClr val="tx1"/>
+                </a:solidFill>
+                <a:latin typeface="+mn-lt"/>
+                <a:ea typeface="+mn-ea"/>
+                <a:cs typeface="+mn-cs"/>
+              </a:defRPr>
+            </a:lvl9pPr>
+          </a:lstStyle>
+          <a:p>
+            <a:pPr marL="0" indent="0">
+              <a:buNone/>
+            </a:pPr>
+            <a:r>
+              <a:rPr lang="pt-BR" sz="2000" b="1" dirty="0"/>
+              <a:t>Orientadores</a:t>
+            </a:r>
+          </a:p>
+          <a:p>
+            <a:r>
+              <a:rPr lang="pt-BR" sz="2000" dirty="0"/>
+              <a:t>Prof. Dr. Fabio Luiz Sant’Anna </a:t>
+            </a:r>
+            <a:r>
+              <a:rPr lang="pt-BR" sz="2000" dirty="0" err="1"/>
+              <a:t>Cuppo</a:t>
+            </a:r>
+            <a:endParaRPr lang="pt-BR" sz="2000" dirty="0"/>
+          </a:p>
+          <a:p>
+            <a:r>
+              <a:rPr lang="pt-BR" sz="2000" dirty="0"/>
+              <a:t>Prof. Dr. Jorge de Oliveira </a:t>
+            </a:r>
+            <a:r>
+              <a:rPr lang="pt-BR" sz="2000" dirty="0" err="1"/>
+              <a:t>Echeimberg</a:t>
+            </a:r>
+            <a:endParaRPr lang="pt-BR" sz="2000" dirty="0"/>
+          </a:p>
+        </p:txBody>
+      </p:sp>
+    </p:spTree>
+    <p:extLst>
+      <p:ext uri="{BB962C8B-B14F-4D97-AF65-F5344CB8AC3E}">
+        <p14:creationId xmlns:p14="http://schemas.microsoft.com/office/powerpoint/2010/main" val="204110988"/>
+      </p:ext>
+    </p:extLst>
+  </p:cSld>
+  <p:clrMapOvr>
+    <a:masterClrMapping/>
+  </p:clrMapOvr>
+</p:sld>
+</file>
+
+<file path=ppt/slides/slide20.xml><?xml version="1.0" encoding="utf-8"?>
+<p:sld xmlns:a="http://schemas.openxmlformats.org/drawingml/2006/main" xmlns:r="http://schemas.openxmlformats.org/officeDocument/2006/relationships" xmlns:p="http://schemas.openxmlformats.org/presentationml/2006/main">
+  <p:cSld>
+    <p:spTree>
+      <p:nvGrpSpPr>
+        <p:cNvPr id="1" name=""/>
+        <p:cNvGrpSpPr/>
+        <p:nvPr/>
+      </p:nvGrpSpPr>
+      <p:grpSpPr>
+        <a:xfrm>
+          <a:off x="0" y="0"/>
+          <a:ext cx="0" cy="0"/>
+          <a:chOff x="0" y="0"/>
+          <a:chExt cx="0" cy="0"/>
+        </a:xfrm>
+      </p:grpSpPr>
+      <p:sp>
+        <p:nvSpPr>
+          <p:cNvPr id="2" name="Título 1">
+            <a:extLst>
+              <a:ext uri="{FF2B5EF4-FFF2-40B4-BE49-F238E27FC236}">
+                <a16:creationId xmlns:a16="http://schemas.microsoft.com/office/drawing/2014/main" id="{916A1FC5-5193-4A4C-BD71-6093A3CD26A3}"/>
+              </a:ext>
+            </a:extLst>
+          </p:cNvPr>
+          <p:cNvSpPr>
+            <a:spLocks noGrp="1"/>
+          </p:cNvSpPr>
+          <p:nvPr>
+            <p:ph type="title"/>
+          </p:nvPr>
+        </p:nvSpPr>
+        <p:spPr/>
+        <p:txBody>
+          <a:bodyPr/>
+          <a:lstStyle/>
+          <a:p>
+            <a:endParaRPr lang="pt-BR" dirty="0"/>
+          </a:p>
+        </p:txBody>
+      </p:sp>
+      <p:sp>
+        <p:nvSpPr>
+          <p:cNvPr id="3" name="Espaço Reservado para Conteúdo 2">
+            <a:extLst>
+              <a:ext uri="{FF2B5EF4-FFF2-40B4-BE49-F238E27FC236}">
+                <a16:creationId xmlns:a16="http://schemas.microsoft.com/office/drawing/2014/main" id="{28B13707-DE9D-40E5-A307-70DBC4D9103B}"/>
+              </a:ext>
+            </a:extLst>
+          </p:cNvPr>
+          <p:cNvSpPr>
+            <a:spLocks noGrp="1"/>
+          </p:cNvSpPr>
+          <p:nvPr>
+            <p:ph idx="1"/>
+          </p:nvPr>
+        </p:nvSpPr>
+        <p:spPr/>
+        <p:txBody>
+          <a:bodyPr/>
+          <a:lstStyle/>
+          <a:p>
+            <a:r>
+              <a:rPr lang="pt-BR" dirty="0"/>
+              <a:t>O que eu quero? Colocar limitações</a:t>
+            </a:r>
+          </a:p>
+          <a:p>
+            <a:r>
+              <a:rPr lang="pt-BR" dirty="0"/>
+              <a:t>O que minha ferramenta permite?</a:t>
+            </a:r>
+          </a:p>
+          <a:p>
+            <a:r>
+              <a:rPr lang="pt-BR" dirty="0"/>
+              <a:t>O que eu espero dela?</a:t>
+            </a:r>
+          </a:p>
+          <a:p>
+            <a:r>
+              <a:rPr lang="pt-BR" dirty="0" err="1"/>
+              <a:t>Logbook</a:t>
+            </a:r>
+            <a:r>
+              <a:rPr lang="pt-BR" dirty="0"/>
+              <a:t> anotar os problemas que teve e como solucionou, para gerar a </a:t>
+            </a:r>
+            <a:r>
+              <a:rPr lang="pt-BR"/>
+              <a:t>metodologia.</a:t>
+            </a:r>
+            <a:endParaRPr lang="pt-BR" dirty="0"/>
+          </a:p>
+          <a:p>
+            <a:endParaRPr lang="pt-BR" dirty="0"/>
+          </a:p>
+        </p:txBody>
+      </p:sp>
+    </p:spTree>
+    <p:extLst>
+      <p:ext uri="{BB962C8B-B14F-4D97-AF65-F5344CB8AC3E}">
+        <p14:creationId xmlns:p14="http://schemas.microsoft.com/office/powerpoint/2010/main" val="3597794942"/>
+      </p:ext>
+    </p:extLst>
+  </p:cSld>
+  <p:clrMapOvr>
+    <a:masterClrMapping/>
+  </p:clrMapOvr>
+</p:sld>
+</file>
+
+<file path=ppt/slides/slide3.xml><?xml version="1.0" encoding="utf-8"?>
 <p:sld xmlns:a="http://schemas.openxmlformats.org/drawingml/2006/main" xmlns:r="http://schemas.openxmlformats.org/officeDocument/2006/relationships" xmlns:p="http://schemas.openxmlformats.org/presentationml/2006/main">
   <p:cSld>
     <p:bg>
@@ -12166,7 +12963,7 @@
           <a:p>
             <a:r>
               <a:rPr lang="pt-BR" sz="2800" dirty="0"/>
-              <a:t>Porque uma RNN-LSTM?</a:t>
+              <a:t>Por que uma RNN-LSTM?</a:t>
             </a:r>
           </a:p>
         </p:txBody>
@@ -12383,7 +13180,7 @@
         </p:spPr>
         <p:txBody>
           <a:bodyPr anchor="t">
-            <a:normAutofit/>
+            <a:normAutofit fontScale="92500" lnSpcReduction="10000"/>
           </a:bodyPr>
           <a:lstStyle/>
           <a:p>
@@ -12393,8 +13190,8 @@
               </a:lnSpc>
             </a:pPr>
             <a:r>
-              <a:rPr lang="pt-BR" sz="1700"/>
-              <a:t>Baseado em resultados obtidos pelo Jornal de pesquisa internacional de engenharia e tecnologia, o melhor resultado obtido foi com uma rede neural recorrente, pelo fato de atualmente as nuvens nos oferecerem processamento suficiente, hoje é possível rodar uma rede neural complexa. </a:t>
+              <a:rPr lang="pt-BR" sz="1700" dirty="0"/>
+              <a:t>Baseado em resultados obtidos pelo Jornal de pesquisa internacional de engenharia e tecnologia, o melhor resultado obtido foi com uma rede neural recorrente, pelo fato de atualmente as nuvens nos oferecerem processamento suficiente, hoje é possível rodar uma rede neural complexa.  (Referenciar, e falar que foi obtido a partir de sinais eletrocardiográficos).</a:t>
             </a:r>
           </a:p>
         </p:txBody>
@@ -12546,7 +13343,7 @@
 </p:sld>
 </file>
 
-<file path=ppt/slides/slide3.xml><?xml version="1.0" encoding="utf-8"?>
+<file path=ppt/slides/slide4.xml><?xml version="1.0" encoding="utf-8"?>
 <p:sld xmlns:a="http://schemas.openxmlformats.org/drawingml/2006/main" xmlns:r="http://schemas.openxmlformats.org/officeDocument/2006/relationships" xmlns:p="http://schemas.openxmlformats.org/presentationml/2006/main">
   <p:cSld>
     <p:bg>
@@ -13355,7 +14152,7 @@
 </p:sld>
 </file>
 
-<file path=ppt/slides/slide4.xml><?xml version="1.0" encoding="utf-8"?>
+<file path=ppt/slides/slide5.xml><?xml version="1.0" encoding="utf-8"?>
 <p:sld xmlns:a="http://schemas.openxmlformats.org/drawingml/2006/main" xmlns:r="http://schemas.openxmlformats.org/officeDocument/2006/relationships" xmlns:p="http://schemas.openxmlformats.org/presentationml/2006/main">
   <p:cSld>
     <p:bg>
@@ -13903,7 +14700,7 @@
 </p:sld>
 </file>
 
-<file path=ppt/slides/slide5.xml><?xml version="1.0" encoding="utf-8"?>
+<file path=ppt/slides/slide6.xml><?xml version="1.0" encoding="utf-8"?>
 <p:sld xmlns:a="http://schemas.openxmlformats.org/drawingml/2006/main" xmlns:r="http://schemas.openxmlformats.org/officeDocument/2006/relationships" xmlns:p="http://schemas.openxmlformats.org/presentationml/2006/main">
   <p:cSld>
     <p:spTree>
@@ -13970,7 +14767,7 @@
 </p:sld>
 </file>
 
-<file path=ppt/slides/slide6.xml><?xml version="1.0" encoding="utf-8"?>
+<file path=ppt/slides/slide7.xml><?xml version="1.0" encoding="utf-8"?>
 <p:sld xmlns:a="http://schemas.openxmlformats.org/drawingml/2006/main" xmlns:r="http://schemas.openxmlformats.org/officeDocument/2006/relationships" xmlns:p="http://schemas.openxmlformats.org/presentationml/2006/main">
   <p:cSld>
     <p:bg>
@@ -14079,17 +14876,56 @@
         </p:spPr>
         <p:txBody>
           <a:bodyPr vert="horz" lIns="91440" tIns="45720" rIns="91440" bIns="45720" rtlCol="0" anchor="b">
-            <a:normAutofit/>
+            <a:normAutofit fontScale="90000"/>
           </a:bodyPr>
           <a:lstStyle/>
           <a:p>
             <a:r>
               <a:rPr lang="en-US" sz="5200" dirty="0" err="1"/>
-              <a:t>Treino</a:t>
+              <a:t>Treinamento</a:t>
             </a:r>
             <a:r>
               <a:rPr lang="en-US" sz="5200" dirty="0"/>
               <a:t> em X</a:t>
+            </a:r>
+            <a:br>
+              <a:rPr lang="en-US" sz="5200" dirty="0"/>
+            </a:br>
+            <a:r>
+              <a:rPr lang="en-US" sz="5200" dirty="0"/>
+              <a:t>(X </a:t>
+            </a:r>
+            <a:r>
+              <a:rPr lang="en-US" sz="5200" dirty="0" err="1"/>
+              <a:t>são</a:t>
+            </a:r>
+            <a:r>
+              <a:rPr lang="en-US" sz="5200" dirty="0"/>
+              <a:t> </a:t>
+            </a:r>
+            <a:r>
+              <a:rPr lang="en-US" sz="5200" dirty="0" err="1"/>
+              <a:t>os</a:t>
+            </a:r>
+            <a:r>
+              <a:rPr lang="en-US" sz="5200" dirty="0"/>
+              <a:t> dados de </a:t>
+            </a:r>
+            <a:r>
+              <a:rPr lang="en-US" sz="5200" dirty="0" err="1"/>
+              <a:t>treinamento</a:t>
+            </a:r>
+            <a:r>
+              <a:rPr lang="en-US" sz="5200" dirty="0"/>
+              <a:t> </a:t>
+            </a:r>
+            <a:r>
+              <a:rPr lang="en-US" sz="5200" dirty="0" err="1"/>
+              <a:t>coletados</a:t>
+            </a:r>
+            <a:r>
+              <a:rPr lang="en-US" sz="5200" dirty="0"/>
+              <a:t>)</a:t>
             </a:r>
           </a:p>
         </p:txBody>
@@ -14335,7 +15171,7 @@
         </p:spPr>
         <p:txBody>
           <a:bodyPr vert="horz" lIns="91440" tIns="45720" rIns="91440" bIns="45720" rtlCol="0">
-            <a:normAutofit/>
+            <a:normAutofit lnSpcReduction="10000"/>
           </a:bodyPr>
           <a:lstStyle/>
           <a:p>
@@ -14350,8 +15186,321 @@
               <a:buChar char="•"/>
             </a:pPr>
             <a:r>
-              <a:rPr lang="en-US"/>
-              <a:t>Nosso treino em X consiste de um array de arrays, ou seja, dentro do array existem múltiplos arrays cada um contendo 20 passos ou seja 20 pontos que se movem no tempo. (Adotamos 20 pontos como padrão por conta de exemplos).</a:t>
+              <a:rPr lang="en-US" dirty="0" err="1"/>
+              <a:t>Nosso</a:t>
+            </a:r>
+            <a:r>
+              <a:rPr lang="en-US" dirty="0"/>
+              <a:t> </a:t>
+            </a:r>
+            <a:r>
+              <a:rPr lang="en-US" dirty="0" err="1"/>
+              <a:t>treinamento</a:t>
+            </a:r>
+            <a:r>
+              <a:rPr lang="en-US" dirty="0"/>
+              <a:t> em X </a:t>
+            </a:r>
+            <a:r>
+              <a:rPr lang="en-US" dirty="0" err="1"/>
+              <a:t>consiste</a:t>
+            </a:r>
+            <a:r>
+              <a:rPr lang="en-US" dirty="0"/>
+              <a:t> de um array de arrays, </a:t>
+            </a:r>
+            <a:r>
+              <a:rPr lang="en-US" dirty="0" err="1"/>
+              <a:t>ou</a:t>
+            </a:r>
+            <a:r>
+              <a:rPr lang="en-US" dirty="0"/>
+              <a:t> </a:t>
+            </a:r>
+            <a:r>
+              <a:rPr lang="en-US" dirty="0" err="1"/>
+              <a:t>seja</a:t>
+            </a:r>
+            <a:r>
+              <a:rPr lang="en-US" dirty="0"/>
+              <a:t>, dentro do array </a:t>
+            </a:r>
+            <a:r>
+              <a:rPr lang="en-US" dirty="0" err="1"/>
+              <a:t>existem</a:t>
+            </a:r>
+            <a:r>
+              <a:rPr lang="en-US" dirty="0"/>
+              <a:t> </a:t>
+            </a:r>
+            <a:r>
+              <a:rPr lang="en-US" dirty="0" err="1"/>
+              <a:t>múltiplos</a:t>
+            </a:r>
+            <a:r>
+              <a:rPr lang="en-US" dirty="0"/>
+              <a:t> arrays </a:t>
+            </a:r>
+            <a:r>
+              <a:rPr lang="en-US" dirty="0" err="1"/>
+              <a:t>cada</a:t>
+            </a:r>
+            <a:r>
+              <a:rPr lang="en-US" dirty="0"/>
+              <a:t> um </a:t>
+            </a:r>
+            <a:r>
+              <a:rPr lang="en-US" dirty="0" err="1"/>
+              <a:t>contendo</a:t>
+            </a:r>
+            <a:r>
+              <a:rPr lang="en-US" dirty="0"/>
+              <a:t> 20 </a:t>
+            </a:r>
+            <a:r>
+              <a:rPr lang="en-US" dirty="0" err="1"/>
+              <a:t>passos</a:t>
+            </a:r>
+            <a:r>
+              <a:rPr lang="en-US" dirty="0"/>
+              <a:t> </a:t>
+            </a:r>
+            <a:r>
+              <a:rPr lang="en-US" dirty="0" err="1"/>
+              <a:t>ou</a:t>
+            </a:r>
+            <a:r>
+              <a:rPr lang="en-US" dirty="0"/>
+              <a:t> </a:t>
+            </a:r>
+            <a:r>
+              <a:rPr lang="en-US" dirty="0" err="1"/>
+              <a:t>seja</a:t>
+            </a:r>
+            <a:r>
+              <a:rPr lang="en-US" dirty="0"/>
+              <a:t> 20 </a:t>
+            </a:r>
+            <a:r>
+              <a:rPr lang="en-US" dirty="0" err="1"/>
+              <a:t>pontos</a:t>
+            </a:r>
+            <a:r>
+              <a:rPr lang="en-US" dirty="0"/>
+              <a:t> que se </a:t>
+            </a:r>
+            <a:r>
+              <a:rPr lang="en-US" dirty="0" err="1"/>
+              <a:t>movem</a:t>
+            </a:r>
+            <a:r>
+              <a:rPr lang="en-US" dirty="0"/>
+              <a:t> no tempo. (</a:t>
+            </a:r>
+            <a:r>
+              <a:rPr lang="en-US" dirty="0" err="1"/>
+              <a:t>Adotamos</a:t>
+            </a:r>
+            <a:r>
+              <a:rPr lang="en-US" dirty="0"/>
+              <a:t> 20 </a:t>
+            </a:r>
+            <a:r>
+              <a:rPr lang="en-US" dirty="0" err="1"/>
+              <a:t>pontos</a:t>
+            </a:r>
+            <a:r>
+              <a:rPr lang="en-US" dirty="0"/>
+              <a:t> </a:t>
+            </a:r>
+            <a:r>
+              <a:rPr lang="en-US" dirty="0" err="1"/>
+              <a:t>como</a:t>
+            </a:r>
+            <a:r>
+              <a:rPr lang="en-US" dirty="0"/>
+              <a:t> </a:t>
+            </a:r>
+            <a:r>
+              <a:rPr lang="en-US" dirty="0" err="1"/>
+              <a:t>padrão</a:t>
+            </a:r>
+            <a:r>
+              <a:rPr lang="en-US" dirty="0"/>
+              <a:t> por </a:t>
+            </a:r>
+            <a:r>
+              <a:rPr lang="en-US" dirty="0" err="1"/>
+              <a:t>conta</a:t>
+            </a:r>
+            <a:r>
+              <a:rPr lang="en-US" dirty="0"/>
+              <a:t> de </a:t>
+            </a:r>
+            <a:r>
+              <a:rPr lang="en-US" dirty="0" err="1"/>
+              <a:t>exemplos</a:t>
+            </a:r>
+            <a:r>
+              <a:rPr lang="en-US" dirty="0"/>
+              <a:t>).</a:t>
+            </a:r>
+          </a:p>
+          <a:p>
+            <a:pPr indent="-228600">
+              <a:lnSpc>
+                <a:spcPct val="110000"/>
+              </a:lnSpc>
+              <a:spcAft>
+                <a:spcPts val="600"/>
+              </a:spcAft>
+              <a:buFont typeface="Arial" panose="020B0604020202020204" pitchFamily="34" charset="0"/>
+              <a:buChar char="•"/>
+            </a:pPr>
+            <a:endParaRPr lang="en-US" dirty="0"/>
+          </a:p>
+          <a:p>
+            <a:pPr indent="-228600">
+              <a:lnSpc>
+                <a:spcPct val="110000"/>
+              </a:lnSpc>
+              <a:spcAft>
+                <a:spcPts val="600"/>
+              </a:spcAft>
+              <a:buFont typeface="Arial" panose="020B0604020202020204" pitchFamily="34" charset="0"/>
+              <a:buChar char="•"/>
+            </a:pPr>
+            <a:r>
+              <a:rPr lang="en-US" dirty="0"/>
+              <a:t>(</a:t>
+            </a:r>
+            <a:r>
+              <a:rPr lang="en-US" dirty="0" err="1"/>
+              <a:t>Usar</a:t>
+            </a:r>
+            <a:r>
+              <a:rPr lang="en-US" dirty="0"/>
+              <a:t> </a:t>
+            </a:r>
+            <a:r>
+              <a:rPr lang="en-US" dirty="0" err="1"/>
+              <a:t>flechinhas</a:t>
+            </a:r>
+            <a:r>
+              <a:rPr lang="en-US" dirty="0"/>
+              <a:t> para </a:t>
+            </a:r>
+            <a:r>
+              <a:rPr lang="en-US" dirty="0" err="1"/>
+              <a:t>referenciar</a:t>
+            </a:r>
+            <a:r>
+              <a:rPr lang="en-US" dirty="0"/>
+              <a:t>, e </a:t>
+            </a:r>
+            <a:r>
+              <a:rPr lang="en-US" dirty="0" err="1"/>
+              <a:t>explicar</a:t>
+            </a:r>
+            <a:r>
+              <a:rPr lang="en-US" dirty="0"/>
+              <a:t> de </a:t>
+            </a:r>
+            <a:r>
+              <a:rPr lang="en-US" dirty="0" err="1"/>
+              <a:t>onde</a:t>
+            </a:r>
+            <a:r>
+              <a:rPr lang="en-US" dirty="0"/>
+              <a:t> </a:t>
+            </a:r>
+            <a:r>
+              <a:rPr lang="en-US" dirty="0" err="1"/>
+              <a:t>vem</a:t>
+            </a:r>
+            <a:r>
+              <a:rPr lang="en-US" dirty="0"/>
+              <a:t> </a:t>
+            </a:r>
+            <a:r>
+              <a:rPr lang="en-US" dirty="0" err="1"/>
+              <a:t>os</a:t>
+            </a:r>
+            <a:r>
+              <a:rPr lang="en-US" dirty="0"/>
+              <a:t> </a:t>
+            </a:r>
+            <a:r>
+              <a:rPr lang="en-US" dirty="0" err="1"/>
+              <a:t>números</a:t>
+            </a:r>
+            <a:r>
+              <a:rPr lang="en-US" dirty="0"/>
+              <a:t> do arrays, </a:t>
+            </a:r>
+            <a:r>
+              <a:rPr lang="en-US" dirty="0" err="1"/>
+              <a:t>talvez</a:t>
+            </a:r>
+            <a:r>
+              <a:rPr lang="en-US" dirty="0"/>
+              <a:t> </a:t>
+            </a:r>
+            <a:r>
+              <a:rPr lang="en-US" dirty="0" err="1"/>
+              <a:t>usar</a:t>
+            </a:r>
+            <a:r>
+              <a:rPr lang="en-US" dirty="0"/>
+              <a:t> o </a:t>
+            </a:r>
+            <a:r>
+              <a:rPr lang="en-US" dirty="0" err="1"/>
+              <a:t>gráfico</a:t>
+            </a:r>
+            <a:r>
+              <a:rPr lang="en-US" dirty="0"/>
+              <a:t> anterior para </a:t>
+            </a:r>
+            <a:r>
+              <a:rPr lang="en-US" dirty="0" err="1"/>
+              <a:t>referenciar</a:t>
+            </a:r>
+            <a:r>
+              <a:rPr lang="en-US" dirty="0"/>
+              <a:t>) </a:t>
+            </a:r>
+            <a:r>
+              <a:rPr lang="en-US" dirty="0" err="1"/>
+              <a:t>Tentar</a:t>
+            </a:r>
+            <a:r>
+              <a:rPr lang="en-US" dirty="0"/>
+              <a:t> </a:t>
+            </a:r>
+            <a:r>
+              <a:rPr lang="en-US" dirty="0" err="1"/>
+              <a:t>explicar</a:t>
+            </a:r>
+            <a:r>
+              <a:rPr lang="en-US" dirty="0"/>
+              <a:t> </a:t>
+            </a:r>
+            <a:r>
+              <a:rPr lang="en-US" dirty="0" err="1"/>
+              <a:t>melhor</a:t>
+            </a:r>
+            <a:r>
+              <a:rPr lang="en-US" dirty="0"/>
+              <a:t> para um </a:t>
+            </a:r>
+            <a:r>
+              <a:rPr lang="en-US" dirty="0" err="1"/>
+              <a:t>leigo</a:t>
+            </a:r>
+            <a:r>
+              <a:rPr lang="en-US" dirty="0"/>
+              <a:t>.</a:t>
             </a:r>
           </a:p>
         </p:txBody>
@@ -14369,7 +15518,7 @@
 </p:sld>
 </file>
 
-<file path=ppt/slides/slide7.xml><?xml version="1.0" encoding="utf-8"?>
+<file path=ppt/slides/slide8.xml><?xml version="1.0" encoding="utf-8"?>
 <p:sld xmlns:a="http://schemas.openxmlformats.org/drawingml/2006/main" xmlns:r="http://schemas.openxmlformats.org/officeDocument/2006/relationships" xmlns:p="http://schemas.openxmlformats.org/presentationml/2006/main">
   <p:cSld>
     <p:bg>
@@ -14483,8 +15632,44 @@
           <a:lstStyle/>
           <a:p>
             <a:r>
-              <a:rPr lang="en-US" sz="3600"/>
-              <a:t>Treino em Y</a:t>
+              <a:rPr lang="en-US" sz="3600" dirty="0" err="1"/>
+              <a:t>Treino</a:t>
+            </a:r>
+            <a:r>
+              <a:rPr lang="en-US" sz="3600" dirty="0"/>
+              <a:t> em Y (Valor que o X </a:t>
+            </a:r>
+            <a:r>
+              <a:rPr lang="en-US" sz="3600" dirty="0" err="1"/>
+              <a:t>deveria</a:t>
+            </a:r>
+            <a:r>
+              <a:rPr lang="en-US" sz="3600" dirty="0"/>
+              <a:t> </a:t>
+            </a:r>
+            <a:r>
+              <a:rPr lang="en-US" sz="3600" dirty="0" err="1"/>
+              <a:t>ter</a:t>
+            </a:r>
+            <a:r>
+              <a:rPr lang="en-US" sz="3600" dirty="0"/>
+              <a:t>, </a:t>
+            </a:r>
+            <a:r>
+              <a:rPr lang="en-US" sz="3600" dirty="0" err="1"/>
+              <a:t>depois</a:t>
+            </a:r>
+            <a:r>
+              <a:rPr lang="en-US" sz="3600" dirty="0"/>
+              <a:t> do </a:t>
+            </a:r>
+            <a:r>
+              <a:rPr lang="en-US" sz="3600" dirty="0" err="1"/>
+              <a:t>treino</a:t>
+            </a:r>
+            <a:r>
+              <a:rPr lang="en-US" sz="3600" dirty="0"/>
+              <a:t>).</a:t>
             </a:r>
           </a:p>
         </p:txBody>
@@ -14736,7 +15921,7 @@
         </p:spPr>
         <p:txBody>
           <a:bodyPr vert="horz" lIns="91440" tIns="45720" rIns="91440" bIns="45720" rtlCol="0" anchor="ctr">
-            <a:normAutofit/>
+            <a:normAutofit fontScale="85000" lnSpcReduction="10000"/>
           </a:bodyPr>
           <a:lstStyle/>
           <a:p>
@@ -14868,6 +16053,251 @@
             </a:r>
             <a:r>
               <a:rPr lang="en-US" sz="1700" dirty="0"/>
+              <a:t>.</a:t>
+            </a:r>
+          </a:p>
+          <a:p>
+            <a:pPr indent="-228600">
+              <a:lnSpc>
+                <a:spcPct val="110000"/>
+              </a:lnSpc>
+              <a:spcAft>
+                <a:spcPts val="600"/>
+              </a:spcAft>
+              <a:buFont typeface="Arial" panose="020B0604020202020204" pitchFamily="34" charset="0"/>
+              <a:buChar char="•"/>
+            </a:pPr>
+            <a:endParaRPr lang="en-US" sz="1700" dirty="0"/>
+          </a:p>
+          <a:p>
+            <a:pPr indent="-228600">
+              <a:lnSpc>
+                <a:spcPct val="110000"/>
+              </a:lnSpc>
+              <a:spcAft>
+                <a:spcPts val="600"/>
+              </a:spcAft>
+              <a:buFont typeface="Arial" panose="020B0604020202020204" pitchFamily="34" charset="0"/>
+              <a:buChar char="•"/>
+            </a:pPr>
+            <a:r>
+              <a:rPr lang="en-US" sz="1700" b="1" dirty="0"/>
+              <a:t>(</a:t>
+            </a:r>
+            <a:r>
+              <a:rPr lang="en-US" sz="1700" b="1" dirty="0" err="1"/>
+              <a:t>Explicar</a:t>
+            </a:r>
+            <a:r>
+              <a:rPr lang="en-US" sz="1700" b="1" dirty="0"/>
+              <a:t> por </a:t>
+            </a:r>
+            <a:r>
+              <a:rPr lang="en-US" sz="1700" b="1" dirty="0" err="1"/>
+              <a:t>texto</a:t>
+            </a:r>
+            <a:r>
+              <a:rPr lang="en-US" sz="1700" b="1" dirty="0"/>
+              <a:t> </a:t>
+            </a:r>
+            <a:r>
+              <a:rPr lang="en-US" sz="1700" b="1" dirty="0" err="1"/>
+              <a:t>cada</a:t>
+            </a:r>
+            <a:r>
+              <a:rPr lang="en-US" sz="1700" b="1" dirty="0"/>
+              <a:t> 20 de X </a:t>
+            </a:r>
+            <a:r>
+              <a:rPr lang="en-US" sz="1700" b="1" dirty="0" err="1"/>
+              <a:t>vira</a:t>
+            </a:r>
+            <a:r>
+              <a:rPr lang="en-US" sz="1700" b="1" dirty="0"/>
+              <a:t> em 1 Y).</a:t>
+            </a:r>
+          </a:p>
+          <a:p>
+            <a:pPr indent="-228600">
+              <a:lnSpc>
+                <a:spcPct val="110000"/>
+              </a:lnSpc>
+              <a:spcAft>
+                <a:spcPts val="600"/>
+              </a:spcAft>
+              <a:buFont typeface="Arial" panose="020B0604020202020204" pitchFamily="34" charset="0"/>
+              <a:buChar char="•"/>
+            </a:pPr>
+            <a:r>
+              <a:rPr lang="en-US" sz="1700" b="1" dirty="0"/>
+              <a:t>A </a:t>
+            </a:r>
+            <a:r>
+              <a:rPr lang="en-US" sz="1700" b="1" dirty="0" err="1"/>
+              <a:t>resposta</a:t>
+            </a:r>
+            <a:r>
+              <a:rPr lang="en-US" sz="1700" b="1" dirty="0"/>
+              <a:t> do </a:t>
+            </a:r>
+            <a:r>
+              <a:rPr lang="en-US" sz="1700" b="1" dirty="0" err="1"/>
+              <a:t>treinamento</a:t>
+            </a:r>
+            <a:r>
+              <a:rPr lang="en-US" sz="1700" b="1" dirty="0"/>
+              <a:t> em X </a:t>
+            </a:r>
+            <a:r>
+              <a:rPr lang="en-US" sz="1700" b="1" dirty="0" err="1"/>
+              <a:t>ela</a:t>
+            </a:r>
+            <a:r>
+              <a:rPr lang="en-US" sz="1700" b="1" dirty="0"/>
+              <a:t> </a:t>
+            </a:r>
+            <a:r>
+              <a:rPr lang="en-US" sz="1700" b="1" dirty="0" err="1"/>
+              <a:t>entra</a:t>
+            </a:r>
+            <a:r>
+              <a:rPr lang="en-US" sz="1700" b="1" dirty="0"/>
+              <a:t> </a:t>
+            </a:r>
+            <a:r>
+              <a:rPr lang="en-US" sz="1700" b="1" dirty="0" err="1"/>
+              <a:t>como</a:t>
+            </a:r>
+            <a:r>
+              <a:rPr lang="en-US" sz="1700" b="1" dirty="0"/>
+              <a:t> o valor 21 da </a:t>
+            </a:r>
+            <a:r>
+              <a:rPr lang="en-US" sz="1700" b="1" dirty="0" err="1"/>
+              <a:t>próxima</a:t>
+            </a:r>
+            <a:r>
+              <a:rPr lang="en-US" sz="1700" b="1" dirty="0"/>
+              <a:t>? </a:t>
+            </a:r>
+            <a:r>
+              <a:rPr lang="en-US" sz="1700" b="1" dirty="0" err="1"/>
+              <a:t>Pesquisar</a:t>
+            </a:r>
+            <a:r>
+              <a:rPr lang="en-US" sz="1700" b="1" dirty="0"/>
+              <a:t>.</a:t>
+            </a:r>
+          </a:p>
+          <a:p>
+            <a:pPr indent="-228600">
+              <a:lnSpc>
+                <a:spcPct val="110000"/>
+              </a:lnSpc>
+              <a:spcAft>
+                <a:spcPts val="600"/>
+              </a:spcAft>
+              <a:buFont typeface="Arial" panose="020B0604020202020204" pitchFamily="34" charset="0"/>
+              <a:buChar char="•"/>
+            </a:pPr>
+            <a:r>
+              <a:rPr lang="en-US" sz="1700" b="1" dirty="0" err="1"/>
+              <a:t>Ou</a:t>
+            </a:r>
+            <a:r>
+              <a:rPr lang="en-US" sz="1700" b="1" dirty="0"/>
+              <a:t> </a:t>
+            </a:r>
+            <a:r>
+              <a:rPr lang="en-US" sz="1700" b="1" dirty="0" err="1"/>
+              <a:t>será</a:t>
+            </a:r>
+            <a:r>
+              <a:rPr lang="en-US" sz="1700" b="1" dirty="0"/>
+              <a:t> </a:t>
+            </a:r>
+            <a:r>
+              <a:rPr lang="en-US" sz="1700" b="1" dirty="0" err="1"/>
+              <a:t>ele</a:t>
+            </a:r>
+            <a:r>
+              <a:rPr lang="en-US" sz="1700" b="1" dirty="0"/>
+              <a:t> um </a:t>
+            </a:r>
+            <a:r>
+              <a:rPr lang="en-US" sz="1700" b="1" dirty="0" err="1"/>
+              <a:t>termo</a:t>
+            </a:r>
+            <a:r>
+              <a:rPr lang="en-US" sz="1700" b="1" dirty="0"/>
+              <a:t> </a:t>
+            </a:r>
+            <a:r>
+              <a:rPr lang="en-US" sz="1700" b="1" dirty="0" err="1"/>
+              <a:t>interpolado</a:t>
+            </a:r>
+            <a:r>
+              <a:rPr lang="en-US" sz="1700" b="1" dirty="0"/>
+              <a:t> que </a:t>
+            </a:r>
+            <a:r>
+              <a:rPr lang="en-US" sz="1700" b="1" dirty="0" err="1"/>
+              <a:t>fica</a:t>
+            </a:r>
+            <a:r>
+              <a:rPr lang="en-US" sz="1700" b="1" dirty="0"/>
+              <a:t> entre o 20 e o 21?</a:t>
+            </a:r>
+          </a:p>
+          <a:p>
+            <a:pPr indent="-228600">
+              <a:lnSpc>
+                <a:spcPct val="110000"/>
+              </a:lnSpc>
+              <a:spcAft>
+                <a:spcPts val="600"/>
+              </a:spcAft>
+              <a:buFont typeface="Arial" panose="020B0604020202020204" pitchFamily="34" charset="0"/>
+              <a:buChar char="•"/>
+            </a:pPr>
+            <a:r>
+              <a:rPr lang="en-US" sz="1700" b="1" dirty="0" err="1"/>
+              <a:t>Explicar</a:t>
+            </a:r>
+            <a:r>
+              <a:rPr lang="en-US" sz="1700" b="1" dirty="0"/>
+              <a:t> que </a:t>
+            </a:r>
+            <a:r>
+              <a:rPr lang="en-US" sz="1700" b="1" dirty="0" err="1"/>
+              <a:t>isso</a:t>
+            </a:r>
+            <a:r>
+              <a:rPr lang="en-US" sz="1700" b="1" dirty="0"/>
+              <a:t> é </a:t>
+            </a:r>
+            <a:r>
+              <a:rPr lang="en-US" sz="1700" b="1" dirty="0" err="1"/>
+              <a:t>uma</a:t>
+            </a:r>
+            <a:r>
+              <a:rPr lang="en-US" sz="1700" b="1" dirty="0"/>
+              <a:t> </a:t>
+            </a:r>
+            <a:r>
+              <a:rPr lang="en-US" sz="1700" b="1" dirty="0" err="1"/>
+              <a:t>espécie</a:t>
+            </a:r>
+            <a:r>
+              <a:rPr lang="en-US" sz="1700" b="1" dirty="0"/>
+              <a:t> de </a:t>
+            </a:r>
+            <a:r>
+              <a:rPr lang="en-US" sz="1700" b="1" dirty="0" err="1"/>
+              <a:t>validação</a:t>
+            </a:r>
+            <a:r>
+              <a:rPr lang="en-US" sz="1700" b="1" dirty="0"/>
               <a:t>.</a:t>
             </a:r>
           </a:p>
@@ -14886,7 +16316,7 @@
 </p:sld>
 </file>
 
-<file path=ppt/slides/slide8.xml><?xml version="1.0" encoding="utf-8"?>
+<file path=ppt/slides/slide9.xml><?xml version="1.0" encoding="utf-8"?>
 <p:sld xmlns:a="http://schemas.openxmlformats.org/drawingml/2006/main" xmlns:r="http://schemas.openxmlformats.org/officeDocument/2006/relationships" xmlns:p="http://schemas.openxmlformats.org/presentationml/2006/main">
   <p:cSld>
     <p:bg>
@@ -14990,12 +16420,12 @@
         <p:spPr>
           <a:xfrm>
             <a:off x="429768" y="411480"/>
-            <a:ext cx="11201400" cy="1106424"/>
+            <a:ext cx="11201400" cy="1618656"/>
           </a:xfrm>
         </p:spPr>
         <p:txBody>
           <a:bodyPr vert="horz" lIns="91440" tIns="45720" rIns="91440" bIns="45720" rtlCol="0">
-            <a:normAutofit/>
+            <a:normAutofit fontScale="90000"/>
           </a:bodyPr>
           <a:lstStyle/>
           <a:p>
@@ -15019,7 +16449,109 @@
               <a:rPr lang="en-US" sz="3600" dirty="0" err="1"/>
               <a:t>resultados</a:t>
             </a:r>
-            <a:endParaRPr lang="en-US" sz="3600" dirty="0"/>
+            <a:br>
+              <a:rPr lang="en-US" sz="3600" dirty="0"/>
+            </a:br>
+            <a:r>
+              <a:rPr lang="en-US" sz="3600" dirty="0"/>
+              <a:t>(</a:t>
+            </a:r>
+            <a:r>
+              <a:rPr lang="en-US" sz="3600" dirty="0" err="1"/>
+              <a:t>Variar</a:t>
+            </a:r>
+            <a:r>
+              <a:rPr lang="en-US" sz="3600" dirty="0"/>
+              <a:t> o  </a:t>
+            </a:r>
+            <a:r>
+              <a:rPr lang="en-US" sz="3600" dirty="0" err="1"/>
+              <a:t>número</a:t>
+            </a:r>
+            <a:r>
+              <a:rPr lang="en-US" sz="3600" dirty="0"/>
+              <a:t> de </a:t>
+            </a:r>
+            <a:r>
+              <a:rPr lang="en-US" sz="3600" dirty="0" err="1"/>
+              <a:t>passos</a:t>
+            </a:r>
+            <a:r>
+              <a:rPr lang="en-US" sz="3600" dirty="0"/>
+              <a:t>, [10,50,100]), </a:t>
+            </a:r>
+            <a:r>
+              <a:rPr lang="en-US" sz="3600" dirty="0" err="1"/>
+              <a:t>verificar</a:t>
+            </a:r>
+            <a:r>
+              <a:rPr lang="en-US" sz="3600" dirty="0"/>
+              <a:t> </a:t>
+            </a:r>
+            <a:r>
+              <a:rPr lang="en-US" sz="3600" dirty="0" err="1"/>
+              <a:t>como</a:t>
+            </a:r>
+            <a:r>
+              <a:rPr lang="en-US" sz="3600" dirty="0"/>
+              <a:t> o loss </a:t>
+            </a:r>
+            <a:r>
+              <a:rPr lang="en-US" sz="3600" dirty="0" err="1"/>
+              <a:t>vai</a:t>
+            </a:r>
+            <a:r>
+              <a:rPr lang="en-US" sz="3600" dirty="0"/>
+              <a:t> </a:t>
+            </a:r>
+            <a:r>
+              <a:rPr lang="en-US" sz="3600" dirty="0" err="1"/>
+              <a:t>convergir</a:t>
+            </a:r>
+            <a:r>
+              <a:rPr lang="en-US" sz="3600" dirty="0"/>
+              <a:t>. </a:t>
+            </a:r>
+            <a:r>
+              <a:rPr lang="en-US" sz="3600" dirty="0" err="1"/>
+              <a:t>Entender</a:t>
+            </a:r>
+            <a:r>
+              <a:rPr lang="en-US" sz="3600" dirty="0"/>
+              <a:t> </a:t>
+            </a:r>
+            <a:r>
+              <a:rPr lang="en-US" sz="3600" dirty="0" err="1"/>
+              <a:t>como</a:t>
+            </a:r>
+            <a:r>
+              <a:rPr lang="en-US" sz="3600" dirty="0"/>
+              <a:t> </a:t>
+            </a:r>
+            <a:r>
+              <a:rPr lang="en-US" sz="3600" dirty="0" err="1"/>
+              <a:t>funciona</a:t>
+            </a:r>
+            <a:r>
+              <a:rPr lang="en-US" sz="3600" dirty="0"/>
+              <a:t> o </a:t>
+            </a:r>
+            <a:r>
+              <a:rPr lang="en-US" sz="3600" dirty="0" err="1"/>
+              <a:t>validar</a:t>
+            </a:r>
+            <a:r>
+              <a:rPr lang="en-US" sz="3600" dirty="0"/>
+              <a:t> para 50 </a:t>
+            </a:r>
+            <a:r>
+              <a:rPr lang="en-US" sz="3600" dirty="0" err="1"/>
+              <a:t>passos</a:t>
+            </a:r>
+            <a:r>
+              <a:rPr lang="en-US" sz="3600" dirty="0"/>
+              <a:t>.</a:t>
+            </a:r>
           </a:p>
         </p:txBody>
       </p:sp>
@@ -15283,72 +16815,6 @@
     <p:extLst>
       <p:ext uri="{BB962C8B-B14F-4D97-AF65-F5344CB8AC3E}">
         <p14:creationId xmlns:p14="http://schemas.microsoft.com/office/powerpoint/2010/main" val="3440877722"/>
-      </p:ext>
-    </p:extLst>
-  </p:cSld>
-  <p:clrMapOvr>
-    <a:masterClrMapping/>
-  </p:clrMapOvr>
-</p:sld>
-</file>
-
-<file path=ppt/slides/slide9.xml><?xml version="1.0" encoding="utf-8"?>
-<p:sld xmlns:a="http://schemas.openxmlformats.org/drawingml/2006/main" xmlns:r="http://schemas.openxmlformats.org/officeDocument/2006/relationships" xmlns:p="http://schemas.openxmlformats.org/presentationml/2006/main">
-  <p:cSld>
-    <p:spTree>
-      <p:nvGrpSpPr>
-        <p:cNvPr id="1" name=""/>
-        <p:cNvGrpSpPr/>
-        <p:nvPr/>
-      </p:nvGrpSpPr>
-      <p:grpSpPr>
-        <a:xfrm>
-          <a:off x="0" y="0"/>
-          <a:ext cx="0" cy="0"/>
-          <a:chOff x="0" y="0"/>
-          <a:chExt cx="0" cy="0"/>
-        </a:xfrm>
-      </p:grpSpPr>
-      <p:sp>
-        <p:nvSpPr>
-          <p:cNvPr id="2" name="Título 1">
-            <a:extLst>
-              <a:ext uri="{FF2B5EF4-FFF2-40B4-BE49-F238E27FC236}">
-                <a16:creationId xmlns:a16="http://schemas.microsoft.com/office/drawing/2014/main" id="{137722C4-DACF-4430-A32B-7FAC84A2AEB4}"/>
-              </a:ext>
-            </a:extLst>
-          </p:cNvPr>
-          <p:cNvSpPr>
-            <a:spLocks noGrp="1"/>
-          </p:cNvSpPr>
-          <p:nvPr>
-            <p:ph type="title"/>
-          </p:nvPr>
-        </p:nvSpPr>
-        <p:spPr>
-          <a:xfrm>
-            <a:off x="1524003" y="1999615"/>
-            <a:ext cx="9144000" cy="2764028"/>
-          </a:xfrm>
-        </p:spPr>
-        <p:txBody>
-          <a:bodyPr vert="horz" lIns="91440" tIns="45720" rIns="91440" bIns="45720" rtlCol="0" anchor="ctr">
-            <a:normAutofit/>
-          </a:bodyPr>
-          <a:lstStyle/>
-          <a:p>
-            <a:pPr algn="ctr"/>
-            <a:r>
-              <a:rPr lang="en-US" sz="7200" dirty="0"/>
-              <a:t>Teste</a:t>
-            </a:r>
-          </a:p>
-        </p:txBody>
-      </p:sp>
-    </p:spTree>
-    <p:extLst>
-      <p:ext uri="{BB962C8B-B14F-4D97-AF65-F5344CB8AC3E}">
-        <p14:creationId xmlns:p14="http://schemas.microsoft.com/office/powerpoint/2010/main" val="3407444029"/>
       </p:ext>
     </p:extLst>
   </p:cSld>

</xml_diff>